<commit_message>
modify after first user hearing on 9/06 2019 Friday
</commit_message>
<xml_diff>
--- a/_project_docs/SSE19_CD_PROP.pptx
+++ b/_project_docs/SSE19_CD_PROP.pptx
@@ -710,7 +710,7 @@
           <a:p>
             <a:fld id="{0D8B9427-5D87-47BE-9054-CBA43456A494}" type="datetimeFigureOut">
               <a:rPr lang="en-US" smtClean="0"/>
-              <a:t>9/6/2019</a:t>
+              <a:t>9/8/2019</a:t>
             </a:fld>
             <a:endParaRPr lang="en-US"/>
           </a:p>
@@ -1077,7 +1077,7 @@
           <a:p>
             <a:fld id="{7F75AC96-A94A-4EFA-941E-629D90B07DCA}" type="datetime1">
               <a:rPr lang="en-US" smtClean="0"/>
-              <a:t>9/6/2019</a:t>
+              <a:t>9/8/2019</a:t>
             </a:fld>
             <a:endParaRPr lang="en-US"/>
           </a:p>
@@ -1337,7 +1337,7 @@
           <a:p>
             <a:fld id="{28E4DD02-D83E-44E1-80AC-24211E449872}" type="datetime1">
               <a:rPr lang="en-US" smtClean="0"/>
-              <a:t>9/6/2019</a:t>
+              <a:t>9/8/2019</a:t>
             </a:fld>
             <a:endParaRPr lang="en-US"/>
           </a:p>
@@ -1520,7 +1520,7 @@
           <a:p>
             <a:fld id="{590FE29C-B157-422F-859A-F7FD9925C6DF}" type="datetime1">
               <a:rPr lang="en-US" smtClean="0"/>
-              <a:t>9/6/2019</a:t>
+              <a:t>9/8/2019</a:t>
             </a:fld>
             <a:endParaRPr lang="en-US"/>
           </a:p>
@@ -1727,7 +1727,7 @@
           <a:p>
             <a:fld id="{222956B9-1B7A-4E93-9BE8-9CF9797C4FD7}" type="datetime1">
               <a:rPr lang="en-US" smtClean="0"/>
-              <a:t>9/6/2019</a:t>
+              <a:t>9/8/2019</a:t>
             </a:fld>
             <a:endParaRPr lang="en-US"/>
           </a:p>
@@ -1974,7 +1974,7 @@
           <a:p>
             <a:fld id="{8FDDA07A-1414-433F-ADDC-DE4F1632CEFF}" type="datetime1">
               <a:rPr lang="en-US" smtClean="0"/>
-              <a:t>9/6/2019</a:t>
+              <a:t>9/8/2019</a:t>
             </a:fld>
             <a:endParaRPr lang="en-US"/>
           </a:p>
@@ -2244,7 +2244,7 @@
           <a:p>
             <a:fld id="{C161D7E4-125A-491A-B64A-68E3AAF44881}" type="datetime1">
               <a:rPr lang="en-US" smtClean="0"/>
-              <a:t>9/6/2019</a:t>
+              <a:t>9/8/2019</a:t>
             </a:fld>
             <a:endParaRPr lang="en-US"/>
           </a:p>
@@ -2614,7 +2614,7 @@
           <a:p>
             <a:fld id="{E93B6C20-D5C7-41C5-835F-A26A10E62B70}" type="datetime1">
               <a:rPr lang="en-US" smtClean="0"/>
-              <a:t>9/6/2019</a:t>
+              <a:t>9/8/2019</a:t>
             </a:fld>
             <a:endParaRPr lang="en-US"/>
           </a:p>
@@ -2735,7 +2735,7 @@
           <a:p>
             <a:fld id="{F81CF918-D074-42BD-A4E5-DD0AF41FF4EE}" type="datetime1">
               <a:rPr lang="en-US" smtClean="0"/>
-              <a:t>9/6/2019</a:t>
+              <a:t>9/8/2019</a:t>
             </a:fld>
             <a:endParaRPr lang="en-US"/>
           </a:p>
@@ -2833,7 +2833,7 @@
           <a:p>
             <a:fld id="{15A562FF-6C83-42DE-BF95-A92876B6113C}" type="datetime1">
               <a:rPr lang="en-US" smtClean="0"/>
-              <a:t>9/6/2019</a:t>
+              <a:t>9/8/2019</a:t>
             </a:fld>
             <a:endParaRPr lang="en-US"/>
           </a:p>
@@ -3113,7 +3113,7 @@
           <a:p>
             <a:fld id="{F02CB1CA-7C10-41BE-A92E-7F4C24728A0D}" type="datetime1">
               <a:rPr lang="en-US" smtClean="0"/>
-              <a:t>9/6/2019</a:t>
+              <a:t>9/8/2019</a:t>
             </a:fld>
             <a:endParaRPr lang="en-US"/>
           </a:p>
@@ -3373,7 +3373,7 @@
           <a:p>
             <a:fld id="{3AB9CFE2-B171-479F-BCEB-D30A7B549DEF}" type="datetime1">
               <a:rPr lang="en-US" smtClean="0"/>
-              <a:t>9/6/2019</a:t>
+              <a:t>9/8/2019</a:t>
             </a:fld>
             <a:endParaRPr lang="en-US"/>
           </a:p>
@@ -3587,7 +3587,7 @@
           <a:p>
             <a:fld id="{97F6FE54-B6C4-45BE-83AA-BC975090FA7A}" type="datetime1">
               <a:rPr lang="en-US" smtClean="0"/>
-              <a:t>9/6/2019</a:t>
+              <a:t>9/8/2019</a:t>
             </a:fld>
             <a:endParaRPr lang="en-US"/>
           </a:p>
@@ -4161,7 +4161,7 @@
                   </a:schemeClr>
                 </a:solidFill>
               </a:rPr>
-              <a:t>で「仕事」のペース・メーキングを！</a:t>
+              <a:t>で「働き方」のペース・メーキングを！</a:t>
             </a:r>
             <a:endParaRPr lang="en-US" dirty="0">
               <a:solidFill>
@@ -15987,52 +15987,76 @@
           </a:xfrm>
         </p:spPr>
         <p:txBody>
-          <a:bodyPr/>
-          <a:lstStyle/>
-          <a:p>
-            <a:r>
-              <a:rPr lang="ja-JP" altLang="en-US" dirty="0"/>
-              <a:t>会社視点の「働き方改革」</a:t>
-            </a:r>
-            <a:endParaRPr lang="en-US" altLang="ja-JP" dirty="0"/>
-          </a:p>
-          <a:p>
-            <a:pPr lvl="1"/>
-            <a:r>
-              <a:rPr lang="ja-JP" altLang="en-US" dirty="0"/>
-              <a:t>「労働時間」の短縮に、議論が終始している。</a:t>
-            </a:r>
-            <a:endParaRPr lang="en-US" altLang="ja-JP" dirty="0"/>
-          </a:p>
-          <a:p>
-            <a:pPr lvl="1"/>
-            <a:r>
-              <a:rPr lang="ja-JP" altLang="en-US" dirty="0"/>
-              <a:t>「労働者の生産の効率」</a:t>
+          <a:bodyPr>
+            <a:normAutofit/>
+          </a:bodyPr>
+          <a:lstStyle/>
+          <a:p>
+            <a:pPr marL="0" indent="0">
+              <a:buNone/>
+            </a:pPr>
+            <a:r>
+              <a:rPr lang="ja-JP" altLang="en-US" dirty="0">
+                <a:solidFill>
+                  <a:schemeClr val="accent1"/>
+                </a:solidFill>
+              </a:rPr>
+              <a:t>「労働者の生産効率」</a:t>
             </a:r>
             <a:r>
               <a:rPr lang="en-US" altLang="ja-JP" dirty="0"/>
               <a:t>×</a:t>
             </a:r>
             <a:r>
+              <a:rPr lang="ja-JP" altLang="en-US" dirty="0">
+                <a:solidFill>
+                  <a:srgbClr val="C00000"/>
+                </a:solidFill>
+              </a:rPr>
+              <a:t>「労働時間」</a:t>
+            </a:r>
+            <a:r>
               <a:rPr lang="ja-JP" altLang="en-US" dirty="0"/>
-              <a:t>「労働時間」＝「労働者の生産量」とすると、生産量は、そのまま維持する前提で、労働時間を少なくするというポイントだけに焦点があっている。</a:t>
+              <a:t>＝「労働者の生産量」とした場合</a:t>
             </a:r>
             <a:endParaRPr lang="en-US" altLang="ja-JP" dirty="0"/>
           </a:p>
           <a:p>
+            <a:r>
+              <a:rPr lang="ja-JP" altLang="en-US" dirty="0"/>
+              <a:t>会社視点の「働き方改革」の状況</a:t>
+            </a:r>
+            <a:endParaRPr lang="en-US" altLang="ja-JP" dirty="0"/>
+          </a:p>
+          <a:p>
             <a:pPr lvl="1"/>
             <a:r>
+              <a:rPr lang="ja-JP" altLang="en-US" dirty="0">
+                <a:solidFill>
+                  <a:srgbClr val="C00000"/>
+                </a:solidFill>
+              </a:rPr>
+              <a:t>「労働時間」</a:t>
+            </a:r>
+            <a:r>
               <a:rPr lang="ja-JP" altLang="en-US" dirty="0"/>
-              <a:t>「労働者の生産の効率」を高めるという視点での議論が進んでいない。労働時間を強制的に減らすなどの施策がうたれている。（残業規制など）</a:t>
+              <a:t>の短縮に、視点が置かれている。生産量は、そのまま維持する前提で、労働時間を強制的に減らすなどの施策がうたれている。（残業規制など）</a:t>
             </a:r>
             <a:endParaRPr lang="en-US" altLang="ja-JP" dirty="0"/>
           </a:p>
           <a:p>
             <a:pPr lvl="1"/>
             <a:r>
+              <a:rPr lang="ja-JP" altLang="en-US" dirty="0">
+                <a:solidFill>
+                  <a:schemeClr val="accent1"/>
+                </a:solidFill>
+              </a:rPr>
+              <a:t>「労働者の生産効率」</a:t>
+            </a:r>
+            <a:r>
               <a:rPr lang="ja-JP" altLang="en-US" dirty="0"/>
-              <a:t>が、会社の仕事への評価が、「労働時間」がそのまま評価（残業代）に反映されている。</a:t>
+              <a:t>を高めるという視点での議論が進んでいない。</a:t>
             </a:r>
             <a:endParaRPr lang="en-US" altLang="ja-JP" dirty="0"/>
           </a:p>
@@ -16040,30 +16064,82 @@
             <a:pPr lvl="1"/>
             <a:r>
               <a:rPr lang="ja-JP" altLang="en-US" dirty="0"/>
-              <a:t>「労働時間」で評価するのは、「労働時間」あたりの生産量は同じで、 「労働時間」を増やせば生産量が増えると考え方で、労働集約的な判断基準といえる。＝＞現代のビジネスには、合っていない！</a:t>
+              <a:t>会社の労働への評価が、</a:t>
+            </a:r>
+            <a:r>
+              <a:rPr lang="ja-JP" altLang="en-US" dirty="0">
+                <a:solidFill>
+                  <a:srgbClr val="C00000"/>
+                </a:solidFill>
+              </a:rPr>
+              <a:t>「労働時間」</a:t>
+            </a:r>
+            <a:r>
+              <a:rPr lang="ja-JP" altLang="en-US" dirty="0"/>
+              <a:t>に重きを置いている部分がある（残業時間分残業代が支給される等）</a:t>
             </a:r>
             <a:endParaRPr lang="en-US" altLang="ja-JP" dirty="0"/>
           </a:p>
           <a:p>
+            <a:pPr lvl="1"/>
             <a:r>
               <a:rPr lang="ja-JP" altLang="en-US" dirty="0"/>
-              <a:t>個人視点の「働き方改革」</a:t>
+              <a:t>いまだに、</a:t>
+            </a:r>
+            <a:r>
+              <a:rPr lang="ja-JP" altLang="en-US" dirty="0">
+                <a:solidFill>
+                  <a:srgbClr val="C00000"/>
+                </a:solidFill>
+              </a:rPr>
+              <a:t>「労働時間」</a:t>
+            </a:r>
+            <a:r>
+              <a:rPr lang="ja-JP" altLang="en-US" dirty="0"/>
+              <a:t>を増やせば生産量が増えるという、労働集約的な判断基準が採用されている。現代のビジネスは、知的労働であり、長く労働すれば、多く生産できるという状況ではない。</a:t>
             </a:r>
             <a:endParaRPr lang="en-US" altLang="ja-JP" dirty="0"/>
           </a:p>
           <a:p>
+            <a:r>
+              <a:rPr lang="ja-JP" altLang="en-US" dirty="0"/>
+              <a:t>個人視点の「働き方改革」が目指すべき姿</a:t>
+            </a:r>
+            <a:endParaRPr lang="en-US" altLang="ja-JP" dirty="0"/>
+          </a:p>
+          <a:p>
             <a:pPr lvl="1"/>
             <a:r>
+              <a:rPr lang="ja-JP" altLang="en-US" dirty="0">
+                <a:solidFill>
+                  <a:schemeClr val="accent1"/>
+                </a:solidFill>
+              </a:rPr>
+              <a:t>「労働者の生産効率」</a:t>
+            </a:r>
+            <a:r>
               <a:rPr lang="ja-JP" altLang="en-US" dirty="0"/>
-              <a:t>「労働者の生産の効率」</a:t>
-            </a:r>
-            <a:r>
-              <a:rPr lang="en-US" altLang="ja-JP" dirty="0"/>
-              <a:t>×</a:t>
-            </a:r>
+              <a:t>に視点を置くべき。</a:t>
+            </a:r>
+            <a:endParaRPr lang="en-US" altLang="ja-JP" dirty="0"/>
+          </a:p>
+          <a:p>
+            <a:pPr lvl="1"/>
             <a:r>
               <a:rPr lang="ja-JP" altLang="en-US" dirty="0"/>
-              <a:t>「労働時間」＝「労働者の生産量」の、「生産の効率」に視点を置くべき。</a:t>
+              <a:t>「労働時間あたりの生産量」（＝</a:t>
+            </a:r>
+            <a:r>
+              <a:rPr lang="ja-JP" altLang="en-US" dirty="0">
+                <a:solidFill>
+                  <a:schemeClr val="accent1"/>
+                </a:solidFill>
+              </a:rPr>
+              <a:t>「生産効率」 </a:t>
+            </a:r>
+            <a:r>
+              <a:rPr lang="ja-JP" altLang="en-US" dirty="0"/>
+              <a:t>）は、ヒトにより変わり、ヒトによってもその集中度によって、大きく変わる。</a:t>
             </a:r>
             <a:endParaRPr lang="en-US" altLang="ja-JP" dirty="0"/>
           </a:p>
@@ -16071,15 +16147,19 @@
             <a:pPr lvl="1"/>
             <a:r>
               <a:rPr lang="ja-JP" altLang="en-US" dirty="0"/>
-              <a:t>「労働時間あたりの生産量」（＝生産の効率）は、ヒトにより変わり、ヒトによってもその集中度によって、大きく変わる。</a:t>
-            </a:r>
-            <a:endParaRPr lang="en-US" altLang="ja-JP" dirty="0"/>
-          </a:p>
-          <a:p>
-            <a:pPr lvl="2"/>
+              <a:t>知的労働の場合、生産性に、労働者の集中度が大きく関係している。ヒトが一日に集中できる時間は、４時間程度と言われており、この「集中できる時間」という資源を、どれだけ、効果的に生産に割り当てるかが、</a:t>
+            </a:r>
+            <a:r>
+              <a:rPr lang="ja-JP" altLang="en-US" dirty="0">
+                <a:solidFill>
+                  <a:schemeClr val="accent1"/>
+                </a:solidFill>
+              </a:rPr>
+              <a:t> 「生産効率」</a:t>
+            </a:r>
             <a:r>
               <a:rPr lang="ja-JP" altLang="en-US" dirty="0"/>
-              <a:t>現代のビジネスは、労働集約的でなく、知的労働が多い。知的労働の場合、生産性に、労働者の集中度が大きく関係している。ヒトが一日に集中できる時間は、４時間程度と言われており、この「集中できる時間」という資源を、どれだけ、効果的に生産に割り当てるかが、重要になっている。</a:t>
+              <a:t>を上げるうえで重要になっている。</a:t>
             </a:r>
             <a:endParaRPr lang="en-US" altLang="ja-JP" dirty="0"/>
           </a:p>
@@ -16161,7 +16241,7 @@
         <p:spPr>
           <a:xfrm>
             <a:off x="871747" y="8216205"/>
-            <a:ext cx="8443337" cy="1384995"/>
+            <a:ext cx="10679527" cy="1384995"/>
           </a:xfrm>
           <a:prstGeom prst="rect">
             <a:avLst/>
@@ -16235,7 +16315,7 @@
                   </a:outerShdw>
                 </a:effectLst>
               </a:rPr>
-              <a:t>如何に、生産効率（生産量）を高める、しいては、</a:t>
+              <a:t>如何に、「生産効率」 （生産量）を高めるかを、検討するべき。</a:t>
             </a:r>
             <a:endParaRPr lang="en-US" altLang="ja-JP" sz="2800" dirty="0">
               <a:ln w="0"/>
@@ -16266,7 +16346,7 @@
                   </a:outerShdw>
                 </a:effectLst>
               </a:rPr>
-              <a:t>集中時間を確保するか、重要である</a:t>
+              <a:t>＝＞つまりは、如何に、集中時間を確保するか、重要となる</a:t>
             </a:r>
             <a:endParaRPr lang="en-US" sz="2800" dirty="0">
               <a:ln w="0"/>
@@ -16419,7 +16499,7 @@
                   </a:outerShdw>
                 </a:effectLst>
               </a:rPr>
-              <a:t>労働時間にのみ着眼し、計測するべき内容を把握せずに議論。</a:t>
+              <a:t>「労働時間」にのみ着眼し、議論。実際は、「生産効率」が問題。</a:t>
             </a:r>
             <a:endParaRPr lang="en-US" altLang="ja-JP" sz="2800" dirty="0">
               <a:ln w="0"/>
@@ -16795,7 +16875,7 @@
         <p:spPr>
           <a:xfrm>
             <a:off x="956866" y="5576631"/>
-            <a:ext cx="7725192" cy="1384995"/>
+            <a:ext cx="7725192" cy="1815882"/>
           </a:xfrm>
           <a:prstGeom prst="rect">
             <a:avLst/>
@@ -16839,6 +16919,37 @@
                 </a:effectLst>
               </a:rPr>
               <a:t>レコーディング「働き方」ダイエットしよう！</a:t>
+            </a:r>
+            <a:endParaRPr lang="en-US" altLang="ja-JP" sz="2800" dirty="0">
+              <a:ln w="0"/>
+              <a:solidFill>
+                <a:schemeClr val="accent1"/>
+              </a:solidFill>
+              <a:effectLst>
+                <a:outerShdw blurRad="38100" dist="25400" dir="5400000" algn="ctr" rotWithShape="0">
+                  <a:srgbClr val="6E747A">
+                    <a:alpha val="43000"/>
+                  </a:srgbClr>
+                </a:outerShdw>
+              </a:effectLst>
+            </a:endParaRPr>
+          </a:p>
+          <a:p>
+            <a:r>
+              <a:rPr lang="ja-JP" altLang="en-US" sz="2800" dirty="0">
+                <a:ln w="0"/>
+                <a:solidFill>
+                  <a:schemeClr val="accent1"/>
+                </a:solidFill>
+                <a:effectLst>
+                  <a:outerShdw blurRad="38100" dist="25400" dir="5400000" algn="ctr" rotWithShape="0">
+                    <a:srgbClr val="6E747A">
+                      <a:alpha val="43000"/>
+                    </a:srgbClr>
+                  </a:outerShdw>
+                </a:effectLst>
+              </a:rPr>
+              <a:t>　　～作業量、作業時間、集中度、等を測る</a:t>
             </a:r>
             <a:endParaRPr lang="en-US" altLang="ja-JP" sz="2800" dirty="0">
               <a:ln w="0"/>

</xml_diff>

<commit_message>
modify , insert each service contents
</commit_message>
<xml_diff>
--- a/_project_docs/SSE19_CD_PROP.pptx
+++ b/_project_docs/SSE19_CD_PROP.pptx
@@ -19585,10 +19585,42 @@
             <p:ph idx="1"/>
           </p:nvPr>
         </p:nvSpPr>
-        <p:spPr/>
+        <p:spPr>
+          <a:xfrm>
+            <a:off x="880110" y="1200150"/>
+            <a:ext cx="8721090" cy="7829549"/>
+          </a:xfrm>
+        </p:spPr>
         <p:txBody>
           <a:bodyPr/>
           <a:lstStyle/>
+          <a:p>
+            <a:r>
+              <a:rPr lang="ja-JP" altLang="en-US" dirty="0"/>
+              <a:t>休憩をレコメンド</a:t>
+            </a:r>
+            <a:endParaRPr lang="en-US" altLang="ja-JP" dirty="0"/>
+          </a:p>
+          <a:p>
+            <a:pPr lvl="1"/>
+            <a:r>
+              <a:rPr lang="ja-JP" altLang="en-US" dirty="0"/>
+              <a:t>連続で、１時間以上、</a:t>
+            </a:r>
+            <a:r>
+              <a:rPr lang="en-US" altLang="ja-JP" dirty="0"/>
+              <a:t>PC</a:t>
+            </a:r>
+            <a:r>
+              <a:rPr lang="ja-JP" altLang="en-US" dirty="0"/>
+              <a:t>を操作している場合に、休憩をレコメンド</a:t>
+            </a:r>
+            <a:endParaRPr lang="en-US" altLang="ja-JP" dirty="0"/>
+          </a:p>
+          <a:p>
+            <a:pPr lvl="1"/>
+            <a:endParaRPr lang="en-US" altLang="ja-JP" dirty="0"/>
+          </a:p>
           <a:p>
             <a:r>
               <a:rPr lang="ja-JP" altLang="en-US" dirty="0"/>
@@ -19652,7 +19684,7 @@
             </a:pPr>
             <a:r>
               <a:rPr lang="ja-JP" altLang="en-US" dirty="0"/>
-              <a:t>ドキュメントの作成量、修正量</a:t>
+              <a:t>ドキュメントの作成量、修正量と作業時間</a:t>
             </a:r>
             <a:endParaRPr lang="en-US" altLang="ja-JP" dirty="0"/>
           </a:p>
@@ -19775,6 +19807,286 @@
               <a:t>8</a:t>
             </a:fld>
             <a:endParaRPr lang="en-US"/>
+          </a:p>
+        </p:txBody>
+      </p:sp>
+      <p:sp>
+        <p:nvSpPr>
+          <p:cNvPr id="6" name="Speech Bubble: Rectangle with Corners Rounded 5">
+            <a:extLst>
+              <a:ext uri="{FF2B5EF4-FFF2-40B4-BE49-F238E27FC236}">
+                <a16:creationId xmlns:a16="http://schemas.microsoft.com/office/drawing/2014/main" id="{26AA4932-813E-443D-A241-05B3FD280FC2}"/>
+              </a:ext>
+            </a:extLst>
+          </p:cNvPr>
+          <p:cNvSpPr/>
+          <p:nvPr/>
+        </p:nvSpPr>
+        <p:spPr>
+          <a:xfrm>
+            <a:off x="8743950" y="1428750"/>
+            <a:ext cx="2400302" cy="1121492"/>
+          </a:xfrm>
+          <a:prstGeom prst="wedgeRoundRectCallout">
+            <a:avLst>
+              <a:gd name="adj1" fmla="val -75264"/>
+              <a:gd name="adj2" fmla="val -17415"/>
+              <a:gd name="adj3" fmla="val 16667"/>
+            </a:avLst>
+          </a:prstGeom>
+          <a:ln>
+            <a:solidFill>
+              <a:srgbClr val="C00000"/>
+            </a:solidFill>
+          </a:ln>
+        </p:spPr>
+        <p:style>
+          <a:lnRef idx="2">
+            <a:schemeClr val="accent5"/>
+          </a:lnRef>
+          <a:fillRef idx="1">
+            <a:schemeClr val="lt1"/>
+          </a:fillRef>
+          <a:effectRef idx="0">
+            <a:schemeClr val="accent5"/>
+          </a:effectRef>
+          <a:fontRef idx="minor">
+            <a:schemeClr val="dk1"/>
+          </a:fontRef>
+        </p:style>
+        <p:txBody>
+          <a:bodyPr rot="0" spcFirstLastPara="0" vertOverflow="overflow" horzOverflow="overflow" vert="horz" wrap="square" lIns="91440" tIns="45720" rIns="91440" bIns="45720" numCol="1" spcCol="0" rtlCol="0" fromWordArt="0" anchor="ctr" anchorCtr="0" forceAA="0" compatLnSpc="1">
+            <a:prstTxWarp prst="textNoShape">
+              <a:avLst/>
+            </a:prstTxWarp>
+            <a:noAutofit/>
+          </a:bodyPr>
+          <a:lstStyle/>
+          <a:p>
+            <a:pPr algn="ctr"/>
+            <a:r>
+              <a:rPr lang="ja-JP" altLang="en-US" dirty="0">
+                <a:solidFill>
+                  <a:srgbClr val="FF0000"/>
+                </a:solidFill>
+              </a:rPr>
+              <a:t>集中しすぎで、作業効率が下がるのを防ぎたい</a:t>
+            </a:r>
+            <a:endParaRPr lang="en-US" dirty="0">
+              <a:solidFill>
+                <a:srgbClr val="FF0000"/>
+              </a:solidFill>
+            </a:endParaRPr>
+          </a:p>
+        </p:txBody>
+      </p:sp>
+      <p:sp>
+        <p:nvSpPr>
+          <p:cNvPr id="7" name="Speech Bubble: Rectangle with Corners Rounded 6">
+            <a:extLst>
+              <a:ext uri="{FF2B5EF4-FFF2-40B4-BE49-F238E27FC236}">
+                <a16:creationId xmlns:a16="http://schemas.microsoft.com/office/drawing/2014/main" id="{47B019C8-79C2-4E43-97AD-6E604CCFC161}"/>
+              </a:ext>
+            </a:extLst>
+          </p:cNvPr>
+          <p:cNvSpPr/>
+          <p:nvPr/>
+        </p:nvSpPr>
+        <p:spPr>
+          <a:xfrm>
+            <a:off x="8638292" y="2812273"/>
+            <a:ext cx="2400302" cy="1121492"/>
+          </a:xfrm>
+          <a:prstGeom prst="wedgeRoundRectCallout">
+            <a:avLst>
+              <a:gd name="adj1" fmla="val -75264"/>
+              <a:gd name="adj2" fmla="val -17415"/>
+              <a:gd name="adj3" fmla="val 16667"/>
+            </a:avLst>
+          </a:prstGeom>
+          <a:ln>
+            <a:solidFill>
+              <a:srgbClr val="C00000"/>
+            </a:solidFill>
+          </a:ln>
+        </p:spPr>
+        <p:style>
+          <a:lnRef idx="2">
+            <a:schemeClr val="accent5"/>
+          </a:lnRef>
+          <a:fillRef idx="1">
+            <a:schemeClr val="lt1"/>
+          </a:fillRef>
+          <a:effectRef idx="0">
+            <a:schemeClr val="accent5"/>
+          </a:effectRef>
+          <a:fontRef idx="minor">
+            <a:schemeClr val="dk1"/>
+          </a:fontRef>
+        </p:style>
+        <p:txBody>
+          <a:bodyPr rot="0" spcFirstLastPara="0" vertOverflow="overflow" horzOverflow="overflow" vert="horz" wrap="square" lIns="91440" tIns="45720" rIns="91440" bIns="45720" numCol="1" spcCol="0" rtlCol="0" fromWordArt="0" anchor="ctr" anchorCtr="0" forceAA="0" compatLnSpc="1">
+            <a:prstTxWarp prst="textNoShape">
+              <a:avLst/>
+            </a:prstTxWarp>
+            <a:noAutofit/>
+          </a:bodyPr>
+          <a:lstStyle/>
+          <a:p>
+            <a:pPr algn="ctr"/>
+            <a:r>
+              <a:rPr lang="ja-JP" altLang="en-US" dirty="0">
+                <a:solidFill>
+                  <a:srgbClr val="FF0000"/>
+                </a:solidFill>
+              </a:rPr>
+              <a:t>集中の度合いとその対象がわかる</a:t>
+            </a:r>
+            <a:endParaRPr lang="en-US" dirty="0">
+              <a:solidFill>
+                <a:srgbClr val="FF0000"/>
+              </a:solidFill>
+            </a:endParaRPr>
+          </a:p>
+        </p:txBody>
+      </p:sp>
+      <p:sp>
+        <p:nvSpPr>
+          <p:cNvPr id="8" name="Speech Bubble: Rectangle with Corners Rounded 7">
+            <a:extLst>
+              <a:ext uri="{FF2B5EF4-FFF2-40B4-BE49-F238E27FC236}">
+                <a16:creationId xmlns:a16="http://schemas.microsoft.com/office/drawing/2014/main" id="{B01A3F79-7363-49AE-A96C-07BBFFA87613}"/>
+              </a:ext>
+            </a:extLst>
+          </p:cNvPr>
+          <p:cNvSpPr/>
+          <p:nvPr/>
+        </p:nvSpPr>
+        <p:spPr>
+          <a:xfrm>
+            <a:off x="8663382" y="6163687"/>
+            <a:ext cx="2400302" cy="1121492"/>
+          </a:xfrm>
+          <a:prstGeom prst="wedgeRoundRectCallout">
+            <a:avLst>
+              <a:gd name="adj1" fmla="val -75264"/>
+              <a:gd name="adj2" fmla="val -17415"/>
+              <a:gd name="adj3" fmla="val 16667"/>
+            </a:avLst>
+          </a:prstGeom>
+          <a:ln>
+            <a:solidFill>
+              <a:srgbClr val="C00000"/>
+            </a:solidFill>
+          </a:ln>
+        </p:spPr>
+        <p:style>
+          <a:lnRef idx="2">
+            <a:schemeClr val="accent5"/>
+          </a:lnRef>
+          <a:fillRef idx="1">
+            <a:schemeClr val="lt1"/>
+          </a:fillRef>
+          <a:effectRef idx="0">
+            <a:schemeClr val="accent5"/>
+          </a:effectRef>
+          <a:fontRef idx="minor">
+            <a:schemeClr val="dk1"/>
+          </a:fontRef>
+        </p:style>
+        <p:txBody>
+          <a:bodyPr rot="0" spcFirstLastPara="0" vertOverflow="overflow" horzOverflow="overflow" vert="horz" wrap="square" lIns="91440" tIns="45720" rIns="91440" bIns="45720" numCol="1" spcCol="0" rtlCol="0" fromWordArt="0" anchor="ctr" anchorCtr="0" forceAA="0" compatLnSpc="1">
+            <a:prstTxWarp prst="textNoShape">
+              <a:avLst/>
+            </a:prstTxWarp>
+            <a:noAutofit/>
+          </a:bodyPr>
+          <a:lstStyle/>
+          <a:p>
+            <a:pPr algn="ctr"/>
+            <a:r>
+              <a:rPr lang="ja-JP" altLang="en-US" dirty="0">
+                <a:solidFill>
+                  <a:srgbClr val="FF0000"/>
+                </a:solidFill>
+              </a:rPr>
+              <a:t>仕事、生活、睡眠などの行動が見える</a:t>
+            </a:r>
+            <a:endParaRPr lang="en-US" dirty="0">
+              <a:solidFill>
+                <a:srgbClr val="FF0000"/>
+              </a:solidFill>
+            </a:endParaRPr>
+          </a:p>
+        </p:txBody>
+      </p:sp>
+      <p:sp>
+        <p:nvSpPr>
+          <p:cNvPr id="9" name="Speech Bubble: Rectangle with Corners Rounded 8">
+            <a:extLst>
+              <a:ext uri="{FF2B5EF4-FFF2-40B4-BE49-F238E27FC236}">
+                <a16:creationId xmlns:a16="http://schemas.microsoft.com/office/drawing/2014/main" id="{22E9BE1F-CB08-438D-A432-48AABAC47023}"/>
+              </a:ext>
+            </a:extLst>
+          </p:cNvPr>
+          <p:cNvSpPr/>
+          <p:nvPr/>
+        </p:nvSpPr>
+        <p:spPr>
+          <a:xfrm>
+            <a:off x="8638292" y="4485365"/>
+            <a:ext cx="2400302" cy="1121492"/>
+          </a:xfrm>
+          <a:prstGeom prst="wedgeRoundRectCallout">
+            <a:avLst>
+              <a:gd name="adj1" fmla="val -75264"/>
+              <a:gd name="adj2" fmla="val -17415"/>
+              <a:gd name="adj3" fmla="val 16667"/>
+            </a:avLst>
+          </a:prstGeom>
+          <a:ln>
+            <a:solidFill>
+              <a:srgbClr val="C00000"/>
+            </a:solidFill>
+          </a:ln>
+        </p:spPr>
+        <p:style>
+          <a:lnRef idx="2">
+            <a:schemeClr val="accent5"/>
+          </a:lnRef>
+          <a:fillRef idx="1">
+            <a:schemeClr val="lt1"/>
+          </a:fillRef>
+          <a:effectRef idx="0">
+            <a:schemeClr val="accent5"/>
+          </a:effectRef>
+          <a:fontRef idx="minor">
+            <a:schemeClr val="dk1"/>
+          </a:fontRef>
+        </p:style>
+        <p:txBody>
+          <a:bodyPr rot="0" spcFirstLastPara="0" vertOverflow="overflow" horzOverflow="overflow" vert="horz" wrap="square" lIns="91440" tIns="45720" rIns="91440" bIns="45720" numCol="1" spcCol="0" rtlCol="0" fromWordArt="0" anchor="ctr" anchorCtr="0" forceAA="0" compatLnSpc="1">
+            <a:prstTxWarp prst="textNoShape">
+              <a:avLst/>
+            </a:prstTxWarp>
+            <a:noAutofit/>
+          </a:bodyPr>
+          <a:lstStyle/>
+          <a:p>
+            <a:pPr algn="ctr"/>
+            <a:r>
+              <a:rPr lang="ja-JP" altLang="en-US" dirty="0">
+                <a:solidFill>
+                  <a:srgbClr val="FF0000"/>
+                </a:solidFill>
+              </a:rPr>
+              <a:t>作成した成果物とその操作時間が分かる</a:t>
+            </a:r>
+            <a:endParaRPr lang="en-US" dirty="0">
+              <a:solidFill>
+                <a:srgbClr val="FF0000"/>
+              </a:solidFill>
+            </a:endParaRPr>
           </a:p>
         </p:txBody>
       </p:sp>

</xml_diff>